<commit_message>
presentation update, almost done
</commit_message>
<xml_diff>
--- a/VGD_Presentation.pptx
+++ b/VGD_Presentation.pptx
@@ -16,11 +16,13 @@
     <p:sldId id="264" r:id="rId10"/>
     <p:sldId id="265" r:id="rId11"/>
     <p:sldId id="273" r:id="rId12"/>
-    <p:sldId id="266" r:id="rId13"/>
-    <p:sldId id="267" r:id="rId14"/>
-    <p:sldId id="268" r:id="rId15"/>
-    <p:sldId id="269" r:id="rId16"/>
-    <p:sldId id="274" r:id="rId17"/>
+    <p:sldId id="267" r:id="rId13"/>
+    <p:sldId id="266" r:id="rId14"/>
+    <p:sldId id="275" r:id="rId15"/>
+    <p:sldId id="276" r:id="rId16"/>
+    <p:sldId id="268" r:id="rId17"/>
+    <p:sldId id="269" r:id="rId18"/>
+    <p:sldId id="274" r:id="rId19"/>
   </p:sldIdLst>
   <p:sldSz cx="12192000" cy="6858000"/>
   <p:notesSz cx="6858000" cy="9144000"/>
@@ -1338,7 +1340,7 @@
           <a:p>
             <a:fld id="{8AD0F97B-8611-43BE-B1EE-AEAC2B0CB1CC}" type="datetimeFigureOut">
               <a:rPr lang="en-US" smtClean="0"/>
-              <a:t>3/1/2020</a:t>
+              <a:t>3/2/2020</a:t>
             </a:fld>
             <a:endParaRPr lang="en-US"/>
           </a:p>
@@ -1576,7 +1578,7 @@
           <a:p>
             <a:fld id="{8AD0F97B-8611-43BE-B1EE-AEAC2B0CB1CC}" type="datetimeFigureOut">
               <a:rPr lang="en-US" smtClean="0"/>
-              <a:t>3/1/2020</a:t>
+              <a:t>3/2/2020</a:t>
             </a:fld>
             <a:endParaRPr lang="en-US"/>
           </a:p>
@@ -1756,7 +1758,7 @@
           <a:p>
             <a:fld id="{8AD0F97B-8611-43BE-B1EE-AEAC2B0CB1CC}" type="datetimeFigureOut">
               <a:rPr lang="en-US" smtClean="0"/>
-              <a:t>3/1/2020</a:t>
+              <a:t>3/2/2020</a:t>
             </a:fld>
             <a:endParaRPr lang="en-US"/>
           </a:p>
@@ -1926,7 +1928,7 @@
           <a:p>
             <a:fld id="{8AD0F97B-8611-43BE-B1EE-AEAC2B0CB1CC}" type="datetimeFigureOut">
               <a:rPr lang="en-US" smtClean="0"/>
-              <a:t>3/1/2020</a:t>
+              <a:t>3/2/2020</a:t>
             </a:fld>
             <a:endParaRPr lang="en-US"/>
           </a:p>
@@ -2202,7 +2204,7 @@
           <a:p>
             <a:fld id="{8AD0F97B-8611-43BE-B1EE-AEAC2B0CB1CC}" type="datetimeFigureOut">
               <a:rPr lang="en-US" smtClean="0"/>
-              <a:t>3/1/2020</a:t>
+              <a:t>3/2/2020</a:t>
             </a:fld>
             <a:endParaRPr lang="en-US"/>
           </a:p>
@@ -3403,7 +3405,7 @@
           <a:p>
             <a:fld id="{8AD0F97B-8611-43BE-B1EE-AEAC2B0CB1CC}" type="datetimeFigureOut">
               <a:rPr lang="en-US" smtClean="0"/>
-              <a:t>3/1/2020</a:t>
+              <a:t>3/2/2020</a:t>
             </a:fld>
             <a:endParaRPr lang="en-US"/>
           </a:p>
@@ -3793,7 +3795,7 @@
           <a:p>
             <a:fld id="{8AD0F97B-8611-43BE-B1EE-AEAC2B0CB1CC}" type="datetimeFigureOut">
               <a:rPr lang="en-US" smtClean="0"/>
-              <a:t>3/1/2020</a:t>
+              <a:t>3/2/2020</a:t>
             </a:fld>
             <a:endParaRPr lang="en-US"/>
           </a:p>
@@ -3916,7 +3918,7 @@
           <a:p>
             <a:fld id="{8AD0F97B-8611-43BE-B1EE-AEAC2B0CB1CC}" type="datetimeFigureOut">
               <a:rPr lang="en-US" smtClean="0"/>
-              <a:t>3/1/2020</a:t>
+              <a:t>3/2/2020</a:t>
             </a:fld>
             <a:endParaRPr lang="en-US"/>
           </a:p>
@@ -4011,7 +4013,7 @@
           <a:p>
             <a:fld id="{8AD0F97B-8611-43BE-B1EE-AEAC2B0CB1CC}" type="datetimeFigureOut">
               <a:rPr lang="en-US" smtClean="0"/>
-              <a:t>3/1/2020</a:t>
+              <a:t>3/2/2020</a:t>
             </a:fld>
             <a:endParaRPr lang="en-US"/>
           </a:p>
@@ -4774,7 +4776,7 @@
           <a:p>
             <a:fld id="{8AD0F97B-8611-43BE-B1EE-AEAC2B0CB1CC}" type="datetimeFigureOut">
               <a:rPr lang="en-US" smtClean="0"/>
-              <a:t>3/1/2020</a:t>
+              <a:t>3/2/2020</a:t>
             </a:fld>
             <a:endParaRPr lang="en-US"/>
           </a:p>
@@ -5614,7 +5616,7 @@
           <a:p>
             <a:fld id="{8AD0F97B-8611-43BE-B1EE-AEAC2B0CB1CC}" type="datetimeFigureOut">
               <a:rPr lang="en-US" smtClean="0"/>
-              <a:t>3/1/2020</a:t>
+              <a:t>3/2/2020</a:t>
             </a:fld>
             <a:endParaRPr lang="en-US"/>
           </a:p>
@@ -5841,7 +5843,7 @@
           <a:p>
             <a:fld id="{8AD0F97B-8611-43BE-B1EE-AEAC2B0CB1CC}" type="datetimeFigureOut">
               <a:rPr lang="en-US" smtClean="0"/>
-              <a:t>3/1/2020</a:t>
+              <a:t>3/2/2020</a:t>
             </a:fld>
             <a:endParaRPr lang="en-US"/>
           </a:p>
@@ -12943,7 +12945,7 @@
             <a:pPr lvl="1"/>
             <a:r>
               <a:rPr lang="en-US" dirty="0"/>
-              <a:t>Dr. Dentist - second boss of the game.  A horrifying entity that represents shots from the  doctor and visits to the dentist. Expect a lot of drills and needles.</a:t>
+              <a:t>Dr. Dentist - second boss of the game.  A horrifying entity that represents shots from the doctor and visits to the dentist. Expect a lot of drills and needles.</a:t>
             </a:r>
           </a:p>
           <a:p>
@@ -13223,228 +13225,6 @@
           <p:cNvPr id="2" name="Title 1">
             <a:extLst>
               <a:ext uri="{FF2B5EF4-FFF2-40B4-BE49-F238E27FC236}">
-                <a16:creationId xmlns:a16="http://schemas.microsoft.com/office/drawing/2014/main" id="{3410389D-7531-483E-83D1-CE0674A534A4}"/>
-              </a:ext>
-            </a:extLst>
-          </p:cNvPr>
-          <p:cNvSpPr>
-            <a:spLocks noGrp="1"/>
-          </p:cNvSpPr>
-          <p:nvPr>
-            <p:ph type="title"/>
-          </p:nvPr>
-        </p:nvSpPr>
-        <p:spPr/>
-        <p:txBody>
-          <a:bodyPr/>
-          <a:lstStyle/>
-          <a:p>
-            <a:r>
-              <a:rPr lang="en-US" dirty="0"/>
-              <a:t>Level Design</a:t>
-            </a:r>
-          </a:p>
-        </p:txBody>
-      </p:sp>
-      <p:sp>
-        <p:nvSpPr>
-          <p:cNvPr id="3" name="Content Placeholder 2">
-            <a:extLst>
-              <a:ext uri="{FF2B5EF4-FFF2-40B4-BE49-F238E27FC236}">
-                <a16:creationId xmlns:a16="http://schemas.microsoft.com/office/drawing/2014/main" id="{1A8C5C3E-7CB0-475E-A762-D694DE36EC6E}"/>
-              </a:ext>
-            </a:extLst>
-          </p:cNvPr>
-          <p:cNvSpPr>
-            <a:spLocks noGrp="1"/>
-          </p:cNvSpPr>
-          <p:nvPr>
-            <p:ph idx="1"/>
-          </p:nvPr>
-        </p:nvSpPr>
-        <p:spPr/>
-        <p:txBody>
-          <a:bodyPr/>
-          <a:lstStyle/>
-          <a:p>
-            <a:r>
-              <a:rPr lang="en-US" dirty="0"/>
-              <a:t>(add some detail on levels here)</a:t>
-            </a:r>
-          </a:p>
-        </p:txBody>
-      </p:sp>
-    </p:spTree>
-    <p:extLst>
-      <p:ext uri="{BB962C8B-B14F-4D97-AF65-F5344CB8AC3E}">
-        <p14:creationId xmlns:p14="http://schemas.microsoft.com/office/powerpoint/2010/main" val="1321300878"/>
-      </p:ext>
-    </p:extLst>
-  </p:cSld>
-  <p:clrMapOvr>
-    <a:masterClrMapping/>
-  </p:clrMapOvr>
-  <p:timing>
-    <p:tnLst>
-      <p:par>
-        <p:cTn id="1" dur="indefinite" restart="never" nodeType="tmRoot">
-          <p:childTnLst>
-            <p:seq concurrent="1" nextAc="seek">
-              <p:cTn id="2" dur="indefinite" nodeType="mainSeq">
-                <p:childTnLst>
-                  <p:par>
-                    <p:cTn id="3" fill="hold">
-                      <p:stCondLst>
-                        <p:cond delay="indefinite"/>
-                      </p:stCondLst>
-                      <p:childTnLst>
-                        <p:par>
-                          <p:cTn id="4" fill="hold">
-                            <p:stCondLst>
-                              <p:cond delay="0"/>
-                            </p:stCondLst>
-                            <p:childTnLst>
-                              <p:par>
-                                <p:cTn id="5" presetID="10" presetClass="entr" presetSubtype="0" fill="hold" grpId="0" nodeType="clickEffect">
-                                  <p:stCondLst>
-                                    <p:cond delay="0"/>
-                                  </p:stCondLst>
-                                  <p:childTnLst>
-                                    <p:set>
-                                      <p:cBhvr>
-                                        <p:cTn id="6" dur="1" fill="hold">
-                                          <p:stCondLst>
-                                            <p:cond delay="0"/>
-                                          </p:stCondLst>
-                                        </p:cTn>
-                                        <p:tgtEl>
-                                          <p:spTgt spid="2"/>
-                                        </p:tgtEl>
-                                        <p:attrNameLst>
-                                          <p:attrName>style.visibility</p:attrName>
-                                        </p:attrNameLst>
-                                      </p:cBhvr>
-                                      <p:to>
-                                        <p:strVal val="visible"/>
-                                      </p:to>
-                                    </p:set>
-                                    <p:animEffect transition="in" filter="fade">
-                                      <p:cBhvr>
-                                        <p:cTn id="7" dur="500"/>
-                                        <p:tgtEl>
-                                          <p:spTgt spid="2"/>
-                                        </p:tgtEl>
-                                      </p:cBhvr>
-                                    </p:animEffect>
-                                  </p:childTnLst>
-                                </p:cTn>
-                              </p:par>
-                            </p:childTnLst>
-                          </p:cTn>
-                        </p:par>
-                      </p:childTnLst>
-                    </p:cTn>
-                  </p:par>
-                  <p:par>
-                    <p:cTn id="8" fill="hold">
-                      <p:stCondLst>
-                        <p:cond delay="indefinite"/>
-                      </p:stCondLst>
-                      <p:childTnLst>
-                        <p:par>
-                          <p:cTn id="9" fill="hold">
-                            <p:stCondLst>
-                              <p:cond delay="0"/>
-                            </p:stCondLst>
-                            <p:childTnLst>
-                              <p:par>
-                                <p:cTn id="10" presetID="1" presetClass="entr" presetSubtype="0" fill="hold" grpId="0" nodeType="clickEffect">
-                                  <p:stCondLst>
-                                    <p:cond delay="0"/>
-                                  </p:stCondLst>
-                                  <p:childTnLst>
-                                    <p:set>
-                                      <p:cBhvr>
-                                        <p:cTn id="11" dur="1" fill="hold">
-                                          <p:stCondLst>
-                                            <p:cond delay="0"/>
-                                          </p:stCondLst>
-                                        </p:cTn>
-                                        <p:tgtEl>
-                                          <p:spTgt spid="3">
-                                            <p:txEl>
-                                              <p:pRg st="0" end="0"/>
-                                            </p:txEl>
-                                          </p:spTgt>
-                                        </p:tgtEl>
-                                        <p:attrNameLst>
-                                          <p:attrName>style.visibility</p:attrName>
-                                        </p:attrNameLst>
-                                      </p:cBhvr>
-                                      <p:to>
-                                        <p:strVal val="visible"/>
-                                      </p:to>
-                                    </p:set>
-                                  </p:childTnLst>
-                                </p:cTn>
-                              </p:par>
-                            </p:childTnLst>
-                          </p:cTn>
-                        </p:par>
-                      </p:childTnLst>
-                    </p:cTn>
-                  </p:par>
-                </p:childTnLst>
-              </p:cTn>
-              <p:prevCondLst>
-                <p:cond evt="onPrev" delay="0">
-                  <p:tgtEl>
-                    <p:sldTgt/>
-                  </p:tgtEl>
-                </p:cond>
-              </p:prevCondLst>
-              <p:nextCondLst>
-                <p:cond evt="onNext" delay="0">
-                  <p:tgtEl>
-                    <p:sldTgt/>
-                  </p:tgtEl>
-                </p:cond>
-              </p:nextCondLst>
-            </p:seq>
-          </p:childTnLst>
-        </p:cTn>
-      </p:par>
-    </p:tnLst>
-    <p:bldLst>
-      <p:bldP spid="2" grpId="0"/>
-      <p:bldP spid="3" grpId="0" build="p"/>
-    </p:bldLst>
-  </p:timing>
-</p:sld>
-</file>
-
-<file path=ppt/slides/slide13.xml><?xml version="1.0" encoding="utf-8"?>
-<p:sld xmlns:a="http://schemas.openxmlformats.org/drawingml/2006/main" xmlns:r="http://schemas.openxmlformats.org/officeDocument/2006/relationships" xmlns:p="http://schemas.openxmlformats.org/presentationml/2006/main">
-  <p:cSld>
-    <p:spTree>
-      <p:nvGrpSpPr>
-        <p:cNvPr id="1" name=""/>
-        <p:cNvGrpSpPr/>
-        <p:nvPr/>
-      </p:nvGrpSpPr>
-      <p:grpSpPr>
-        <a:xfrm>
-          <a:off x="0" y="0"/>
-          <a:ext cx="0" cy="0"/>
-          <a:chOff x="0" y="0"/>
-          <a:chExt cx="0" cy="0"/>
-        </a:xfrm>
-      </p:grpSpPr>
-      <p:sp>
-        <p:nvSpPr>
-          <p:cNvPr id="2" name="Title 1">
-            <a:extLst>
-              <a:ext uri="{FF2B5EF4-FFF2-40B4-BE49-F238E27FC236}">
                 <a16:creationId xmlns:a16="http://schemas.microsoft.com/office/drawing/2014/main" id="{AB22960E-25D3-46A4-B377-9FF0A56782F0}"/>
               </a:ext>
             </a:extLst>
@@ -13484,14 +13264,31 @@
             <p:ph idx="1"/>
           </p:nvPr>
         </p:nvSpPr>
-        <p:spPr/>
+        <p:spPr>
+          <a:xfrm>
+            <a:off x="1251678" y="2143389"/>
+            <a:ext cx="10178322" cy="3593591"/>
+          </a:xfrm>
+        </p:spPr>
         <p:txBody>
           <a:bodyPr/>
           <a:lstStyle/>
           <a:p>
             <a:r>
               <a:rPr lang="en-US" dirty="0"/>
-              <a:t>We decided to go with a simple, cell shaded style similar to Risk of Rain 2 and Breath of the Wild. One that is pleasing to look at while not being too complicated in nature. Although the design features use of lower polygon models, we are not looking towards the direction of the low-poly aesthetic where hard edges are clearly defined and noticeable. The simplistic style matches the imaginative nature of an innocent boy fighting imaginary monsters.</a:t>
+              <a:t>We decided to go with a simple, cell shaded style similar to Risk of Rain 2 and Breath of the Wild. One that is pleasing to look at while not being too complicated in nature. </a:t>
+            </a:r>
+          </a:p>
+          <a:p>
+            <a:r>
+              <a:rPr lang="en-US" dirty="0"/>
+              <a:t>Although the design features use of lower polygon models, we are not looking towards the direction of the low-poly aesthetic where hard edges are clearly defined and noticeable. </a:t>
+            </a:r>
+          </a:p>
+          <a:p>
+            <a:r>
+              <a:rPr lang="en-US" dirty="0"/>
+              <a:t>The simplistic style matches the imaginative nature of an innocent boy fighting imaginary monsters.</a:t>
             </a:r>
           </a:p>
           <a:p>
@@ -13619,6 +13416,104 @@
                       </p:childTnLst>
                     </p:cTn>
                   </p:par>
+                  <p:par>
+                    <p:cTn id="12" fill="hold">
+                      <p:stCondLst>
+                        <p:cond delay="indefinite"/>
+                      </p:stCondLst>
+                      <p:childTnLst>
+                        <p:par>
+                          <p:cTn id="13" fill="hold">
+                            <p:stCondLst>
+                              <p:cond delay="0"/>
+                            </p:stCondLst>
+                            <p:childTnLst>
+                              <p:par>
+                                <p:cTn id="14" presetID="1" presetClass="entr" presetSubtype="0" fill="hold" grpId="0" nodeType="clickEffect">
+                                  <p:stCondLst>
+                                    <p:cond delay="0"/>
+                                  </p:stCondLst>
+                                  <p:childTnLst>
+                                    <p:set>
+                                      <p:cBhvr>
+                                        <p:cTn id="15" dur="1" fill="hold">
+                                          <p:stCondLst>
+                                            <p:cond delay="0"/>
+                                          </p:stCondLst>
+                                        </p:cTn>
+                                        <p:tgtEl>
+                                          <p:spTgt spid="3">
+                                            <p:txEl>
+                                              <p:pRg st="1" end="1"/>
+                                            </p:txEl>
+                                          </p:spTgt>
+                                        </p:tgtEl>
+                                        <p:attrNameLst>
+                                          <p:attrName>style.visibility</p:attrName>
+                                        </p:attrNameLst>
+                                      </p:cBhvr>
+                                      <p:to>
+                                        <p:strVal val="visible"/>
+                                      </p:to>
+                                    </p:set>
+                                  </p:childTnLst>
+                                </p:cTn>
+                              </p:par>
+                            </p:childTnLst>
+                          </p:cTn>
+                        </p:par>
+                      </p:childTnLst>
+                    </p:cTn>
+                  </p:par>
+                  <p:par>
+                    <p:cTn id="16" fill="hold">
+                      <p:stCondLst>
+                        <p:cond delay="indefinite"/>
+                      </p:stCondLst>
+                      <p:childTnLst>
+                        <p:par>
+                          <p:cTn id="17" fill="hold">
+                            <p:stCondLst>
+                              <p:cond delay="0"/>
+                            </p:stCondLst>
+                            <p:childTnLst>
+                              <p:par>
+                                <p:cTn id="18" presetID="1" presetClass="entr" presetSubtype="0" fill="hold" grpId="0" nodeType="clickEffect">
+                                  <p:stCondLst>
+                                    <p:cond delay="0"/>
+                                  </p:stCondLst>
+                                  <p:childTnLst>
+                                    <p:set>
+                                      <p:cBhvr>
+                                        <p:cTn id="19" dur="1" fill="hold">
+                                          <p:stCondLst>
+                                            <p:cond delay="0"/>
+                                          </p:stCondLst>
+                                        </p:cTn>
+                                        <p:tgtEl>
+                                          <p:spTgt spid="3">
+                                            <p:txEl>
+                                              <p:pRg st="2" end="2"/>
+                                            </p:txEl>
+                                          </p:spTgt>
+                                        </p:tgtEl>
+                                        <p:attrNameLst>
+                                          <p:attrName>style.visibility</p:attrName>
+                                        </p:attrNameLst>
+                                      </p:cBhvr>
+                                      <p:to>
+                                        <p:strVal val="visible"/>
+                                      </p:to>
+                                    </p:set>
+                                  </p:childTnLst>
+                                </p:cTn>
+                              </p:par>
+                            </p:childTnLst>
+                          </p:cTn>
+                        </p:par>
+                      </p:childTnLst>
+                    </p:cTn>
+                  </p:par>
                 </p:childTnLst>
               </p:cTn>
               <p:prevCondLst>
@@ -13648,7 +13543,999 @@
 </p:sld>
 </file>
 
+<file path=ppt/slides/slide13.xml><?xml version="1.0" encoding="utf-8"?>
+<p:sld xmlns:a="http://schemas.openxmlformats.org/drawingml/2006/main" xmlns:r="http://schemas.openxmlformats.org/officeDocument/2006/relationships" xmlns:p="http://schemas.openxmlformats.org/presentationml/2006/main">
+  <p:cSld>
+    <p:spTree>
+      <p:nvGrpSpPr>
+        <p:cNvPr id="1" name=""/>
+        <p:cNvGrpSpPr/>
+        <p:nvPr/>
+      </p:nvGrpSpPr>
+      <p:grpSpPr>
+        <a:xfrm>
+          <a:off x="0" y="0"/>
+          <a:ext cx="0" cy="0"/>
+          <a:chOff x="0" y="0"/>
+          <a:chExt cx="0" cy="0"/>
+        </a:xfrm>
+      </p:grpSpPr>
+      <p:sp>
+        <p:nvSpPr>
+          <p:cNvPr id="2" name="Title 1">
+            <a:extLst>
+              <a:ext uri="{FF2B5EF4-FFF2-40B4-BE49-F238E27FC236}">
+                <a16:creationId xmlns:a16="http://schemas.microsoft.com/office/drawing/2014/main" id="{3410389D-7531-483E-83D1-CE0674A534A4}"/>
+              </a:ext>
+            </a:extLst>
+          </p:cNvPr>
+          <p:cNvSpPr>
+            <a:spLocks noGrp="1"/>
+          </p:cNvSpPr>
+          <p:nvPr>
+            <p:ph type="title"/>
+          </p:nvPr>
+        </p:nvSpPr>
+        <p:spPr/>
+        <p:txBody>
+          <a:bodyPr/>
+          <a:lstStyle/>
+          <a:p>
+            <a:r>
+              <a:rPr lang="en-US" dirty="0"/>
+              <a:t>Level Design – concept art</a:t>
+            </a:r>
+          </a:p>
+        </p:txBody>
+      </p:sp>
+      <p:pic>
+        <p:nvPicPr>
+          <p:cNvPr id="5" name="Picture 4" descr="A close up of a piece of paper&#10;&#10;Description automatically generated">
+            <a:extLst>
+              <a:ext uri="{FF2B5EF4-FFF2-40B4-BE49-F238E27FC236}">
+                <a16:creationId xmlns:a16="http://schemas.microsoft.com/office/drawing/2014/main" id="{4CD15D67-8073-4089-B935-9C037A7903D8}"/>
+              </a:ext>
+            </a:extLst>
+          </p:cNvPr>
+          <p:cNvPicPr>
+            <a:picLocks noChangeAspect="1"/>
+          </p:cNvPicPr>
+          <p:nvPr/>
+        </p:nvPicPr>
+        <p:blipFill>
+          <a:blip r:embed="rId2">
+            <a:extLst>
+              <a:ext uri="{28A0092B-C50C-407E-A947-70E740481C1C}">
+                <a14:useLocalDpi xmlns:a14="http://schemas.microsoft.com/office/drawing/2010/main" val="0"/>
+              </a:ext>
+            </a:extLst>
+          </a:blip>
+          <a:stretch>
+            <a:fillRect/>
+          </a:stretch>
+        </p:blipFill>
+        <p:spPr>
+          <a:xfrm>
+            <a:off x="8435843" y="2252984"/>
+            <a:ext cx="3269987" cy="4359983"/>
+          </a:xfrm>
+          <a:prstGeom prst="rect">
+            <a:avLst/>
+          </a:prstGeom>
+        </p:spPr>
+      </p:pic>
+      <p:sp>
+        <p:nvSpPr>
+          <p:cNvPr id="6" name="Rectangle 5">
+            <a:extLst>
+              <a:ext uri="{FF2B5EF4-FFF2-40B4-BE49-F238E27FC236}">
+                <a16:creationId xmlns:a16="http://schemas.microsoft.com/office/drawing/2014/main" id="{A7964B45-023E-49A8-B7BD-0C213F786C19}"/>
+              </a:ext>
+            </a:extLst>
+          </p:cNvPr>
+          <p:cNvSpPr/>
+          <p:nvPr/>
+        </p:nvSpPr>
+        <p:spPr>
+          <a:xfrm>
+            <a:off x="5740642" y="1772018"/>
+            <a:ext cx="1200393" cy="369332"/>
+          </a:xfrm>
+          <a:prstGeom prst="rect">
+            <a:avLst/>
+          </a:prstGeom>
+        </p:spPr>
+        <p:txBody>
+          <a:bodyPr wrap="square">
+            <a:spAutoFit/>
+          </a:bodyPr>
+          <a:lstStyle/>
+          <a:p>
+            <a:r>
+              <a:rPr lang="en-US" dirty="0"/>
+              <a:t>Playground</a:t>
+            </a:r>
+          </a:p>
+        </p:txBody>
+      </p:sp>
+      <p:sp>
+        <p:nvSpPr>
+          <p:cNvPr id="7" name="Rectangle 6">
+            <a:extLst>
+              <a:ext uri="{FF2B5EF4-FFF2-40B4-BE49-F238E27FC236}">
+                <a16:creationId xmlns:a16="http://schemas.microsoft.com/office/drawing/2014/main" id="{8FBEA246-EE94-40A0-A4CF-5E4077419057}"/>
+              </a:ext>
+            </a:extLst>
+          </p:cNvPr>
+          <p:cNvSpPr/>
+          <p:nvPr/>
+        </p:nvSpPr>
+        <p:spPr>
+          <a:xfrm>
+            <a:off x="9649087" y="1725932"/>
+            <a:ext cx="843501" cy="369332"/>
+          </a:xfrm>
+          <a:prstGeom prst="rect">
+            <a:avLst/>
+          </a:prstGeom>
+        </p:spPr>
+        <p:txBody>
+          <a:bodyPr wrap="none">
+            <a:spAutoFit/>
+          </a:bodyPr>
+          <a:lstStyle/>
+          <a:p>
+            <a:r>
+              <a:rPr lang="en-US" dirty="0"/>
+              <a:t>Suburb</a:t>
+            </a:r>
+          </a:p>
+        </p:txBody>
+      </p:sp>
+      <p:pic>
+        <p:nvPicPr>
+          <p:cNvPr id="9" name="Picture 8" descr="A close up of a piece of paper&#10;&#10;Description automatically generated">
+            <a:extLst>
+              <a:ext uri="{FF2B5EF4-FFF2-40B4-BE49-F238E27FC236}">
+                <a16:creationId xmlns:a16="http://schemas.microsoft.com/office/drawing/2014/main" id="{240118B0-D6CD-4394-B194-87ECA9EFA612}"/>
+              </a:ext>
+            </a:extLst>
+          </p:cNvPr>
+          <p:cNvPicPr>
+            <a:picLocks noChangeAspect="1"/>
+          </p:cNvPicPr>
+          <p:nvPr/>
+        </p:nvPicPr>
+        <p:blipFill>
+          <a:blip r:embed="rId3">
+            <a:extLst>
+              <a:ext uri="{28A0092B-C50C-407E-A947-70E740481C1C}">
+                <a14:useLocalDpi xmlns:a14="http://schemas.microsoft.com/office/drawing/2010/main" val="0"/>
+              </a:ext>
+            </a:extLst>
+          </a:blip>
+          <a:stretch>
+            <a:fillRect/>
+          </a:stretch>
+        </p:blipFill>
+        <p:spPr>
+          <a:xfrm>
+            <a:off x="4776649" y="2252984"/>
+            <a:ext cx="3269988" cy="4359983"/>
+          </a:xfrm>
+          <a:prstGeom prst="rect">
+            <a:avLst/>
+          </a:prstGeom>
+        </p:spPr>
+      </p:pic>
+      <p:pic>
+        <p:nvPicPr>
+          <p:cNvPr id="11" name="Picture 10" descr="A close up of text on a white background&#10;&#10;Description automatically generated">
+            <a:extLst>
+              <a:ext uri="{FF2B5EF4-FFF2-40B4-BE49-F238E27FC236}">
+                <a16:creationId xmlns:a16="http://schemas.microsoft.com/office/drawing/2014/main" id="{76D297ED-9B23-42F9-870C-31E9B56D1F70}"/>
+              </a:ext>
+            </a:extLst>
+          </p:cNvPr>
+          <p:cNvPicPr>
+            <a:picLocks noChangeAspect="1"/>
+          </p:cNvPicPr>
+          <p:nvPr/>
+        </p:nvPicPr>
+        <p:blipFill>
+          <a:blip r:embed="rId4">
+            <a:extLst>
+              <a:ext uri="{28A0092B-C50C-407E-A947-70E740481C1C}">
+                <a14:useLocalDpi xmlns:a14="http://schemas.microsoft.com/office/drawing/2010/main" val="0"/>
+              </a:ext>
+            </a:extLst>
+          </a:blip>
+          <a:stretch>
+            <a:fillRect/>
+          </a:stretch>
+        </p:blipFill>
+        <p:spPr>
+          <a:xfrm>
+            <a:off x="1117455" y="2252984"/>
+            <a:ext cx="3269987" cy="4359983"/>
+          </a:xfrm>
+          <a:prstGeom prst="rect">
+            <a:avLst/>
+          </a:prstGeom>
+        </p:spPr>
+      </p:pic>
+      <p:sp>
+        <p:nvSpPr>
+          <p:cNvPr id="12" name="Rectangle 11">
+            <a:extLst>
+              <a:ext uri="{FF2B5EF4-FFF2-40B4-BE49-F238E27FC236}">
+                <a16:creationId xmlns:a16="http://schemas.microsoft.com/office/drawing/2014/main" id="{986424FA-B9AD-45F1-98DE-FE4F1256CB8C}"/>
+              </a:ext>
+            </a:extLst>
+          </p:cNvPr>
+          <p:cNvSpPr/>
+          <p:nvPr/>
+        </p:nvSpPr>
+        <p:spPr>
+          <a:xfrm>
+            <a:off x="2251083" y="1823268"/>
+            <a:ext cx="779316" cy="369332"/>
+          </a:xfrm>
+          <a:prstGeom prst="rect">
+            <a:avLst/>
+          </a:prstGeom>
+        </p:spPr>
+        <p:txBody>
+          <a:bodyPr wrap="none">
+            <a:spAutoFit/>
+          </a:bodyPr>
+          <a:lstStyle/>
+          <a:p>
+            <a:r>
+              <a:rPr lang="en-US" dirty="0"/>
+              <a:t>Forest</a:t>
+            </a:r>
+          </a:p>
+        </p:txBody>
+      </p:sp>
+    </p:spTree>
+    <p:extLst>
+      <p:ext uri="{BB962C8B-B14F-4D97-AF65-F5344CB8AC3E}">
+        <p14:creationId xmlns:p14="http://schemas.microsoft.com/office/powerpoint/2010/main" val="1321300878"/>
+      </p:ext>
+    </p:extLst>
+  </p:cSld>
+  <p:clrMapOvr>
+    <a:masterClrMapping/>
+  </p:clrMapOvr>
+  <p:timing>
+    <p:tnLst>
+      <p:par>
+        <p:cTn id="1" dur="indefinite" restart="never" nodeType="tmRoot">
+          <p:childTnLst>
+            <p:seq concurrent="1" nextAc="seek">
+              <p:cTn id="2" dur="indefinite" nodeType="mainSeq">
+                <p:childTnLst>
+                  <p:par>
+                    <p:cTn id="3" fill="hold">
+                      <p:stCondLst>
+                        <p:cond delay="indefinite"/>
+                      </p:stCondLst>
+                      <p:childTnLst>
+                        <p:par>
+                          <p:cTn id="4" fill="hold">
+                            <p:stCondLst>
+                              <p:cond delay="0"/>
+                            </p:stCondLst>
+                            <p:childTnLst>
+                              <p:par>
+                                <p:cTn id="5" presetID="10" presetClass="entr" presetSubtype="0" fill="hold" grpId="0" nodeType="clickEffect">
+                                  <p:stCondLst>
+                                    <p:cond delay="0"/>
+                                  </p:stCondLst>
+                                  <p:childTnLst>
+                                    <p:set>
+                                      <p:cBhvr>
+                                        <p:cTn id="6" dur="1" fill="hold">
+                                          <p:stCondLst>
+                                            <p:cond delay="0"/>
+                                          </p:stCondLst>
+                                        </p:cTn>
+                                        <p:tgtEl>
+                                          <p:spTgt spid="2"/>
+                                        </p:tgtEl>
+                                        <p:attrNameLst>
+                                          <p:attrName>style.visibility</p:attrName>
+                                        </p:attrNameLst>
+                                      </p:cBhvr>
+                                      <p:to>
+                                        <p:strVal val="visible"/>
+                                      </p:to>
+                                    </p:set>
+                                    <p:animEffect transition="in" filter="fade">
+                                      <p:cBhvr>
+                                        <p:cTn id="7" dur="500"/>
+                                        <p:tgtEl>
+                                          <p:spTgt spid="2"/>
+                                        </p:tgtEl>
+                                      </p:cBhvr>
+                                    </p:animEffect>
+                                  </p:childTnLst>
+                                </p:cTn>
+                              </p:par>
+                            </p:childTnLst>
+                          </p:cTn>
+                        </p:par>
+                      </p:childTnLst>
+                    </p:cTn>
+                  </p:par>
+                </p:childTnLst>
+              </p:cTn>
+              <p:prevCondLst>
+                <p:cond evt="onPrev" delay="0">
+                  <p:tgtEl>
+                    <p:sldTgt/>
+                  </p:tgtEl>
+                </p:cond>
+              </p:prevCondLst>
+              <p:nextCondLst>
+                <p:cond evt="onNext" delay="0">
+                  <p:tgtEl>
+                    <p:sldTgt/>
+                  </p:tgtEl>
+                </p:cond>
+              </p:nextCondLst>
+            </p:seq>
+          </p:childTnLst>
+        </p:cTn>
+      </p:par>
+    </p:tnLst>
+    <p:bldLst>
+      <p:bldP spid="2" grpId="0"/>
+    </p:bldLst>
+  </p:timing>
+</p:sld>
+</file>
+
 <file path=ppt/slides/slide14.xml><?xml version="1.0" encoding="utf-8"?>
+<p:sld xmlns:a="http://schemas.openxmlformats.org/drawingml/2006/main" xmlns:r="http://schemas.openxmlformats.org/officeDocument/2006/relationships" xmlns:p="http://schemas.openxmlformats.org/presentationml/2006/main">
+  <p:cSld>
+    <p:spTree>
+      <p:nvGrpSpPr>
+        <p:cNvPr id="1" name=""/>
+        <p:cNvGrpSpPr/>
+        <p:nvPr/>
+      </p:nvGrpSpPr>
+      <p:grpSpPr>
+        <a:xfrm>
+          <a:off x="0" y="0"/>
+          <a:ext cx="0" cy="0"/>
+          <a:chOff x="0" y="0"/>
+          <a:chExt cx="0" cy="0"/>
+        </a:xfrm>
+      </p:grpSpPr>
+      <p:sp>
+        <p:nvSpPr>
+          <p:cNvPr id="2" name="Title 1">
+            <a:extLst>
+              <a:ext uri="{FF2B5EF4-FFF2-40B4-BE49-F238E27FC236}">
+                <a16:creationId xmlns:a16="http://schemas.microsoft.com/office/drawing/2014/main" id="{5D791E92-3690-4BD7-84A4-82DDCC872069}"/>
+              </a:ext>
+            </a:extLst>
+          </p:cNvPr>
+          <p:cNvSpPr>
+            <a:spLocks noGrp="1"/>
+          </p:cNvSpPr>
+          <p:nvPr>
+            <p:ph type="title"/>
+          </p:nvPr>
+        </p:nvSpPr>
+        <p:spPr/>
+        <p:txBody>
+          <a:bodyPr/>
+          <a:lstStyle/>
+          <a:p>
+            <a:r>
+              <a:rPr lang="en-US" dirty="0"/>
+              <a:t>Character Design – Concept Art</a:t>
+            </a:r>
+          </a:p>
+        </p:txBody>
+      </p:sp>
+      <p:pic>
+        <p:nvPicPr>
+          <p:cNvPr id="5" name="Picture 4" descr="A close up of text on a whiteboard&#10;&#10;Description automatically generated">
+            <a:extLst>
+              <a:ext uri="{FF2B5EF4-FFF2-40B4-BE49-F238E27FC236}">
+                <a16:creationId xmlns:a16="http://schemas.microsoft.com/office/drawing/2014/main" id="{0B8976C1-8092-47B7-89C5-FEC30CAAD3F4}"/>
+              </a:ext>
+            </a:extLst>
+          </p:cNvPr>
+          <p:cNvPicPr>
+            <a:picLocks noChangeAspect="1"/>
+          </p:cNvPicPr>
+          <p:nvPr/>
+        </p:nvPicPr>
+        <p:blipFill>
+          <a:blip r:embed="rId2">
+            <a:extLst>
+              <a:ext uri="{28A0092B-C50C-407E-A947-70E740481C1C}">
+                <a14:useLocalDpi xmlns:a14="http://schemas.microsoft.com/office/drawing/2010/main" val="0"/>
+              </a:ext>
+            </a:extLst>
+          </a:blip>
+          <a:stretch>
+            <a:fillRect/>
+          </a:stretch>
+        </p:blipFill>
+        <p:spPr>
+          <a:xfrm>
+            <a:off x="1013006" y="2580769"/>
+            <a:ext cx="3375200" cy="2532408"/>
+          </a:xfrm>
+          <a:prstGeom prst="rect">
+            <a:avLst/>
+          </a:prstGeom>
+        </p:spPr>
+      </p:pic>
+      <p:pic>
+        <p:nvPicPr>
+          <p:cNvPr id="7" name="Picture 6" descr="A close up of a whiteboard&#10;&#10;Description automatically generated">
+            <a:extLst>
+              <a:ext uri="{FF2B5EF4-FFF2-40B4-BE49-F238E27FC236}">
+                <a16:creationId xmlns:a16="http://schemas.microsoft.com/office/drawing/2014/main" id="{31FE3658-F429-462F-82E9-BAE7A1318FEF}"/>
+              </a:ext>
+            </a:extLst>
+          </p:cNvPr>
+          <p:cNvPicPr>
+            <a:picLocks noChangeAspect="1"/>
+          </p:cNvPicPr>
+          <p:nvPr/>
+        </p:nvPicPr>
+        <p:blipFill>
+          <a:blip r:embed="rId3">
+            <a:extLst>
+              <a:ext uri="{28A0092B-C50C-407E-A947-70E740481C1C}">
+                <a14:useLocalDpi xmlns:a14="http://schemas.microsoft.com/office/drawing/2010/main" val="0"/>
+              </a:ext>
+            </a:extLst>
+          </a:blip>
+          <a:stretch>
+            <a:fillRect/>
+          </a:stretch>
+        </p:blipFill>
+        <p:spPr>
+          <a:xfrm>
+            <a:off x="4653238" y="2580769"/>
+            <a:ext cx="3375201" cy="2532408"/>
+          </a:xfrm>
+          <a:prstGeom prst="rect">
+            <a:avLst/>
+          </a:prstGeom>
+        </p:spPr>
+      </p:pic>
+      <p:pic>
+        <p:nvPicPr>
+          <p:cNvPr id="9" name="Picture 8" descr="A close up of a whiteboard&#10;&#10;Description automatically generated">
+            <a:extLst>
+              <a:ext uri="{FF2B5EF4-FFF2-40B4-BE49-F238E27FC236}">
+                <a16:creationId xmlns:a16="http://schemas.microsoft.com/office/drawing/2014/main" id="{8BDDA79D-60DB-454F-BF4A-D0A91D2C0F47}"/>
+              </a:ext>
+            </a:extLst>
+          </p:cNvPr>
+          <p:cNvPicPr>
+            <a:picLocks noChangeAspect="1"/>
+          </p:cNvPicPr>
+          <p:nvPr/>
+        </p:nvPicPr>
+        <p:blipFill>
+          <a:blip r:embed="rId4">
+            <a:extLst>
+              <a:ext uri="{28A0092B-C50C-407E-A947-70E740481C1C}">
+                <a14:useLocalDpi xmlns:a14="http://schemas.microsoft.com/office/drawing/2010/main" val="0"/>
+              </a:ext>
+            </a:extLst>
+          </a:blip>
+          <a:stretch>
+            <a:fillRect/>
+          </a:stretch>
+        </p:blipFill>
+        <p:spPr>
+          <a:xfrm>
+            <a:off x="8293471" y="2580769"/>
+            <a:ext cx="3375201" cy="2503540"/>
+          </a:xfrm>
+          <a:prstGeom prst="rect">
+            <a:avLst/>
+          </a:prstGeom>
+        </p:spPr>
+      </p:pic>
+      <p:sp>
+        <p:nvSpPr>
+          <p:cNvPr id="10" name="Rectangle 9">
+            <a:extLst>
+              <a:ext uri="{FF2B5EF4-FFF2-40B4-BE49-F238E27FC236}">
+                <a16:creationId xmlns:a16="http://schemas.microsoft.com/office/drawing/2014/main" id="{7A83BE3B-FA63-4305-A7EF-E1705CADB9F4}"/>
+              </a:ext>
+            </a:extLst>
+          </p:cNvPr>
+          <p:cNvSpPr/>
+          <p:nvPr/>
+        </p:nvSpPr>
+        <p:spPr>
+          <a:xfrm>
+            <a:off x="2354197" y="2042041"/>
+            <a:ext cx="692818" cy="369332"/>
+          </a:xfrm>
+          <a:prstGeom prst="rect">
+            <a:avLst/>
+          </a:prstGeom>
+        </p:spPr>
+        <p:txBody>
+          <a:bodyPr wrap="none">
+            <a:spAutoFit/>
+          </a:bodyPr>
+          <a:lstStyle/>
+          <a:p>
+            <a:r>
+              <a:rPr lang="en-US" dirty="0"/>
+              <a:t>Pablo</a:t>
+            </a:r>
+          </a:p>
+        </p:txBody>
+      </p:sp>
+      <p:sp>
+        <p:nvSpPr>
+          <p:cNvPr id="11" name="Rectangle 10">
+            <a:extLst>
+              <a:ext uri="{FF2B5EF4-FFF2-40B4-BE49-F238E27FC236}">
+                <a16:creationId xmlns:a16="http://schemas.microsoft.com/office/drawing/2014/main" id="{3895FF0E-E39A-4FC3-B51E-7CBF5A2B97B0}"/>
+              </a:ext>
+            </a:extLst>
+          </p:cNvPr>
+          <p:cNvSpPr/>
+          <p:nvPr/>
+        </p:nvSpPr>
+        <p:spPr>
+          <a:xfrm>
+            <a:off x="5567709" y="2042041"/>
+            <a:ext cx="1546257" cy="369332"/>
+          </a:xfrm>
+          <a:prstGeom prst="rect">
+            <a:avLst/>
+          </a:prstGeom>
+        </p:spPr>
+        <p:txBody>
+          <a:bodyPr wrap="none">
+            <a:spAutoFit/>
+          </a:bodyPr>
+          <a:lstStyle/>
+          <a:p>
+            <a:r>
+              <a:rPr lang="en-US" dirty="0"/>
+              <a:t>Older Brother</a:t>
+            </a:r>
+          </a:p>
+        </p:txBody>
+      </p:sp>
+      <p:sp>
+        <p:nvSpPr>
+          <p:cNvPr id="12" name="Rectangle 11">
+            <a:extLst>
+              <a:ext uri="{FF2B5EF4-FFF2-40B4-BE49-F238E27FC236}">
+                <a16:creationId xmlns:a16="http://schemas.microsoft.com/office/drawing/2014/main" id="{3771EF3C-36C7-4B1C-88D3-1F87610CDD3A}"/>
+              </a:ext>
+            </a:extLst>
+          </p:cNvPr>
+          <p:cNvSpPr/>
+          <p:nvPr/>
+        </p:nvSpPr>
+        <p:spPr>
+          <a:xfrm>
+            <a:off x="9201851" y="2042041"/>
+            <a:ext cx="1558440" cy="369332"/>
+          </a:xfrm>
+          <a:prstGeom prst="rect">
+            <a:avLst/>
+          </a:prstGeom>
+        </p:spPr>
+        <p:txBody>
+          <a:bodyPr wrap="none">
+            <a:spAutoFit/>
+          </a:bodyPr>
+          <a:lstStyle/>
+          <a:p>
+            <a:r>
+              <a:rPr lang="en-US" dirty="0"/>
+              <a:t>Homeless Guy</a:t>
+            </a:r>
+          </a:p>
+        </p:txBody>
+      </p:sp>
+    </p:spTree>
+    <p:extLst>
+      <p:ext uri="{BB962C8B-B14F-4D97-AF65-F5344CB8AC3E}">
+        <p14:creationId xmlns:p14="http://schemas.microsoft.com/office/powerpoint/2010/main" val="4138656210"/>
+      </p:ext>
+    </p:extLst>
+  </p:cSld>
+  <p:clrMapOvr>
+    <a:masterClrMapping/>
+  </p:clrMapOvr>
+  <p:timing>
+    <p:tnLst>
+      <p:par>
+        <p:cTn id="1" dur="indefinite" restart="never" nodeType="tmRoot">
+          <p:childTnLst>
+            <p:seq concurrent="1" nextAc="seek">
+              <p:cTn id="2" dur="indefinite" nodeType="mainSeq">
+                <p:childTnLst>
+                  <p:par>
+                    <p:cTn id="3" fill="hold">
+                      <p:stCondLst>
+                        <p:cond delay="indefinite"/>
+                      </p:stCondLst>
+                      <p:childTnLst>
+                        <p:par>
+                          <p:cTn id="4" fill="hold">
+                            <p:stCondLst>
+                              <p:cond delay="0"/>
+                            </p:stCondLst>
+                            <p:childTnLst>
+                              <p:par>
+                                <p:cTn id="5" presetID="10" presetClass="entr" presetSubtype="0" fill="hold" grpId="0" nodeType="clickEffect">
+                                  <p:stCondLst>
+                                    <p:cond delay="0"/>
+                                  </p:stCondLst>
+                                  <p:childTnLst>
+                                    <p:set>
+                                      <p:cBhvr>
+                                        <p:cTn id="6" dur="1" fill="hold">
+                                          <p:stCondLst>
+                                            <p:cond delay="0"/>
+                                          </p:stCondLst>
+                                        </p:cTn>
+                                        <p:tgtEl>
+                                          <p:spTgt spid="2"/>
+                                        </p:tgtEl>
+                                        <p:attrNameLst>
+                                          <p:attrName>style.visibility</p:attrName>
+                                        </p:attrNameLst>
+                                      </p:cBhvr>
+                                      <p:to>
+                                        <p:strVal val="visible"/>
+                                      </p:to>
+                                    </p:set>
+                                    <p:animEffect transition="in" filter="fade">
+                                      <p:cBhvr>
+                                        <p:cTn id="7" dur="500"/>
+                                        <p:tgtEl>
+                                          <p:spTgt spid="2"/>
+                                        </p:tgtEl>
+                                      </p:cBhvr>
+                                    </p:animEffect>
+                                  </p:childTnLst>
+                                </p:cTn>
+                              </p:par>
+                            </p:childTnLst>
+                          </p:cTn>
+                        </p:par>
+                      </p:childTnLst>
+                    </p:cTn>
+                  </p:par>
+                </p:childTnLst>
+              </p:cTn>
+              <p:prevCondLst>
+                <p:cond evt="onPrev" delay="0">
+                  <p:tgtEl>
+                    <p:sldTgt/>
+                  </p:tgtEl>
+                </p:cond>
+              </p:prevCondLst>
+              <p:nextCondLst>
+                <p:cond evt="onNext" delay="0">
+                  <p:tgtEl>
+                    <p:sldTgt/>
+                  </p:tgtEl>
+                </p:cond>
+              </p:nextCondLst>
+            </p:seq>
+          </p:childTnLst>
+        </p:cTn>
+      </p:par>
+    </p:tnLst>
+    <p:bldLst>
+      <p:bldP spid="2" grpId="0"/>
+    </p:bldLst>
+  </p:timing>
+</p:sld>
+</file>
+
+<file path=ppt/slides/slide15.xml><?xml version="1.0" encoding="utf-8"?>
+<p:sld xmlns:a="http://schemas.openxmlformats.org/drawingml/2006/main" xmlns:r="http://schemas.openxmlformats.org/officeDocument/2006/relationships" xmlns:p="http://schemas.openxmlformats.org/presentationml/2006/main">
+  <p:cSld>
+    <p:spTree>
+      <p:nvGrpSpPr>
+        <p:cNvPr id="1" name=""/>
+        <p:cNvGrpSpPr/>
+        <p:nvPr/>
+      </p:nvGrpSpPr>
+      <p:grpSpPr>
+        <a:xfrm>
+          <a:off x="0" y="0"/>
+          <a:ext cx="0" cy="0"/>
+          <a:chOff x="0" y="0"/>
+          <a:chExt cx="0" cy="0"/>
+        </a:xfrm>
+      </p:grpSpPr>
+      <p:sp>
+        <p:nvSpPr>
+          <p:cNvPr id="2" name="Title 1">
+            <a:extLst>
+              <a:ext uri="{FF2B5EF4-FFF2-40B4-BE49-F238E27FC236}">
+                <a16:creationId xmlns:a16="http://schemas.microsoft.com/office/drawing/2014/main" id="{5576A05B-D9C7-42CA-B445-CA58D4C1881D}"/>
+              </a:ext>
+            </a:extLst>
+          </p:cNvPr>
+          <p:cNvSpPr>
+            <a:spLocks noGrp="1"/>
+          </p:cNvSpPr>
+          <p:nvPr>
+            <p:ph type="title"/>
+          </p:nvPr>
+        </p:nvSpPr>
+        <p:spPr/>
+        <p:txBody>
+          <a:bodyPr/>
+          <a:lstStyle/>
+          <a:p>
+            <a:r>
+              <a:rPr lang="en-US" dirty="0"/>
+              <a:t>Enemy Design – Normal and Boss</a:t>
+            </a:r>
+          </a:p>
+        </p:txBody>
+      </p:sp>
+      <p:sp>
+        <p:nvSpPr>
+          <p:cNvPr id="4" name="Rectangle 3">
+            <a:extLst>
+              <a:ext uri="{FF2B5EF4-FFF2-40B4-BE49-F238E27FC236}">
+                <a16:creationId xmlns:a16="http://schemas.microsoft.com/office/drawing/2014/main" id="{9243A417-2B67-4C66-9C13-1A5948FDBA5B}"/>
+              </a:ext>
+            </a:extLst>
+          </p:cNvPr>
+          <p:cNvSpPr/>
+          <p:nvPr/>
+        </p:nvSpPr>
+        <p:spPr>
+          <a:xfrm>
+            <a:off x="8386144" y="2098870"/>
+            <a:ext cx="1408719" cy="369332"/>
+          </a:xfrm>
+          <a:prstGeom prst="rect">
+            <a:avLst/>
+          </a:prstGeom>
+        </p:spPr>
+        <p:txBody>
+          <a:bodyPr wrap="none">
+            <a:spAutoFit/>
+          </a:bodyPr>
+          <a:lstStyle/>
+          <a:p>
+            <a:r>
+              <a:rPr lang="en-US" dirty="0"/>
+              <a:t>Shadow Boss</a:t>
+            </a:r>
+          </a:p>
+        </p:txBody>
+      </p:sp>
+      <p:sp>
+        <p:nvSpPr>
+          <p:cNvPr id="5" name="Rectangle 4">
+            <a:extLst>
+              <a:ext uri="{FF2B5EF4-FFF2-40B4-BE49-F238E27FC236}">
+                <a16:creationId xmlns:a16="http://schemas.microsoft.com/office/drawing/2014/main" id="{DCAA72B1-B31E-4D6A-AA24-88A978D66660}"/>
+              </a:ext>
+            </a:extLst>
+          </p:cNvPr>
+          <p:cNvSpPr/>
+          <p:nvPr/>
+        </p:nvSpPr>
+        <p:spPr>
+          <a:xfrm>
+            <a:off x="3513732" y="2098870"/>
+            <a:ext cx="816249" cy="369332"/>
+          </a:xfrm>
+          <a:prstGeom prst="rect">
+            <a:avLst/>
+          </a:prstGeom>
+        </p:spPr>
+        <p:txBody>
+          <a:bodyPr wrap="none">
+            <a:spAutoFit/>
+          </a:bodyPr>
+          <a:lstStyle/>
+          <a:p>
+            <a:r>
+              <a:rPr lang="en-US" dirty="0"/>
+              <a:t>Goblin</a:t>
+            </a:r>
+          </a:p>
+        </p:txBody>
+      </p:sp>
+      <p:pic>
+        <p:nvPicPr>
+          <p:cNvPr id="7" name="Picture 6">
+            <a:extLst>
+              <a:ext uri="{FF2B5EF4-FFF2-40B4-BE49-F238E27FC236}">
+                <a16:creationId xmlns:a16="http://schemas.microsoft.com/office/drawing/2014/main" id="{88EB15B5-7A92-4CDD-BE94-C7ABDF110CFE}"/>
+              </a:ext>
+            </a:extLst>
+          </p:cNvPr>
+          <p:cNvPicPr>
+            <a:picLocks noChangeAspect="1"/>
+          </p:cNvPicPr>
+          <p:nvPr/>
+        </p:nvPicPr>
+        <p:blipFill>
+          <a:blip r:embed="rId2">
+            <a:extLst>
+              <a:ext uri="{28A0092B-C50C-407E-A947-70E740481C1C}">
+                <a14:useLocalDpi xmlns:a14="http://schemas.microsoft.com/office/drawing/2010/main" val="0"/>
+              </a:ext>
+            </a:extLst>
+          </a:blip>
+          <a:stretch>
+            <a:fillRect/>
+          </a:stretch>
+        </p:blipFill>
+        <p:spPr>
+          <a:xfrm>
+            <a:off x="1747715" y="2692556"/>
+            <a:ext cx="4348285" cy="3431708"/>
+          </a:xfrm>
+          <a:prstGeom prst="rect">
+            <a:avLst/>
+          </a:prstGeom>
+        </p:spPr>
+      </p:pic>
+      <p:pic>
+        <p:nvPicPr>
+          <p:cNvPr id="9" name="Picture 8" descr="A close up of text on a whiteboard&#10;&#10;Description automatically generated">
+            <a:extLst>
+              <a:ext uri="{FF2B5EF4-FFF2-40B4-BE49-F238E27FC236}">
+                <a16:creationId xmlns:a16="http://schemas.microsoft.com/office/drawing/2014/main" id="{7545EBDF-1272-4589-881D-F6FDAAF3FF2C}"/>
+              </a:ext>
+            </a:extLst>
+          </p:cNvPr>
+          <p:cNvPicPr>
+            <a:picLocks noChangeAspect="1"/>
+          </p:cNvPicPr>
+          <p:nvPr/>
+        </p:nvPicPr>
+        <p:blipFill>
+          <a:blip r:embed="rId3">
+            <a:extLst>
+              <a:ext uri="{28A0092B-C50C-407E-A947-70E740481C1C}">
+                <a14:useLocalDpi xmlns:a14="http://schemas.microsoft.com/office/drawing/2010/main" val="0"/>
+              </a:ext>
+            </a:extLst>
+          </a:blip>
+          <a:stretch>
+            <a:fillRect/>
+          </a:stretch>
+        </p:blipFill>
+        <p:spPr>
+          <a:xfrm>
+            <a:off x="6916362" y="2655333"/>
+            <a:ext cx="4348285" cy="3431708"/>
+          </a:xfrm>
+          <a:prstGeom prst="rect">
+            <a:avLst/>
+          </a:prstGeom>
+        </p:spPr>
+      </p:pic>
+    </p:spTree>
+    <p:extLst>
+      <p:ext uri="{BB962C8B-B14F-4D97-AF65-F5344CB8AC3E}">
+        <p14:creationId xmlns:p14="http://schemas.microsoft.com/office/powerpoint/2010/main" val="516688903"/>
+      </p:ext>
+    </p:extLst>
+  </p:cSld>
+  <p:clrMapOvr>
+    <a:masterClrMapping/>
+  </p:clrMapOvr>
+  <p:timing>
+    <p:tnLst>
+      <p:par>
+        <p:cTn id="1" dur="indefinite" restart="never" nodeType="tmRoot">
+          <p:childTnLst>
+            <p:seq concurrent="1" nextAc="seek">
+              <p:cTn id="2" dur="indefinite" nodeType="mainSeq">
+                <p:childTnLst>
+                  <p:par>
+                    <p:cTn id="3" fill="hold">
+                      <p:stCondLst>
+                        <p:cond delay="indefinite"/>
+                      </p:stCondLst>
+                      <p:childTnLst>
+                        <p:par>
+                          <p:cTn id="4" fill="hold">
+                            <p:stCondLst>
+                              <p:cond delay="0"/>
+                            </p:stCondLst>
+                            <p:childTnLst>
+                              <p:par>
+                                <p:cTn id="5" presetID="10" presetClass="entr" presetSubtype="0" fill="hold" grpId="0" nodeType="clickEffect">
+                                  <p:stCondLst>
+                                    <p:cond delay="0"/>
+                                  </p:stCondLst>
+                                  <p:childTnLst>
+                                    <p:set>
+                                      <p:cBhvr>
+                                        <p:cTn id="6" dur="1" fill="hold">
+                                          <p:stCondLst>
+                                            <p:cond delay="0"/>
+                                          </p:stCondLst>
+                                        </p:cTn>
+                                        <p:tgtEl>
+                                          <p:spTgt spid="2"/>
+                                        </p:tgtEl>
+                                        <p:attrNameLst>
+                                          <p:attrName>style.visibility</p:attrName>
+                                        </p:attrNameLst>
+                                      </p:cBhvr>
+                                      <p:to>
+                                        <p:strVal val="visible"/>
+                                      </p:to>
+                                    </p:set>
+                                    <p:animEffect transition="in" filter="fade">
+                                      <p:cBhvr>
+                                        <p:cTn id="7" dur="500"/>
+                                        <p:tgtEl>
+                                          <p:spTgt spid="2"/>
+                                        </p:tgtEl>
+                                      </p:cBhvr>
+                                    </p:animEffect>
+                                  </p:childTnLst>
+                                </p:cTn>
+                              </p:par>
+                            </p:childTnLst>
+                          </p:cTn>
+                        </p:par>
+                      </p:childTnLst>
+                    </p:cTn>
+                  </p:par>
+                </p:childTnLst>
+              </p:cTn>
+              <p:prevCondLst>
+                <p:cond evt="onPrev" delay="0">
+                  <p:tgtEl>
+                    <p:sldTgt/>
+                  </p:tgtEl>
+                </p:cond>
+              </p:prevCondLst>
+              <p:nextCondLst>
+                <p:cond evt="onNext" delay="0">
+                  <p:tgtEl>
+                    <p:sldTgt/>
+                  </p:tgtEl>
+                </p:cond>
+              </p:nextCondLst>
+            </p:seq>
+          </p:childTnLst>
+        </p:cTn>
+      </p:par>
+    </p:tnLst>
+    <p:bldLst>
+      <p:bldP spid="2" grpId="0"/>
+    </p:bldLst>
+  </p:timing>
+</p:sld>
+</file>
+
+<file path=ppt/slides/slide16.xml><?xml version="1.0" encoding="utf-8"?>
 <p:sld xmlns:a="http://schemas.openxmlformats.org/drawingml/2006/main" xmlns:r="http://schemas.openxmlformats.org/officeDocument/2006/relationships" xmlns:p="http://schemas.openxmlformats.org/presentationml/2006/main">
   <p:cSld>
     <p:spTree>
@@ -13808,13 +14695,8 @@
             <a:pPr lvl="0"/>
             <a:r>
               <a:rPr lang="en-US" dirty="0"/>
-              <a:t>Roll </a:t>
+              <a:t>Roll button shift</a:t>
             </a:r>
-            <a:r>
-              <a:rPr lang="en-US"/>
-              <a:t>button shift</a:t>
-            </a:r>
-            <a:endParaRPr lang="en-US" dirty="0"/>
           </a:p>
           <a:p>
             <a:pPr lvl="0"/>
@@ -14565,7 +15447,7 @@
 </p:sld>
 </file>
 
-<file path=ppt/slides/slide15.xml><?xml version="1.0" encoding="utf-8"?>
+<file path=ppt/slides/slide17.xml><?xml version="1.0" encoding="utf-8"?>
 <p:sld xmlns:a="http://schemas.openxmlformats.org/drawingml/2006/main" xmlns:r="http://schemas.openxmlformats.org/officeDocument/2006/relationships" xmlns:p="http://schemas.openxmlformats.org/presentationml/2006/main">
   <p:cSld>
     <p:spTree>
@@ -14845,7 +15727,7 @@
 </p:sld>
 </file>
 
-<file path=ppt/slides/slide16.xml><?xml version="1.0" encoding="utf-8"?>
+<file path=ppt/slides/slide18.xml><?xml version="1.0" encoding="utf-8"?>
 <p:sld xmlns:a="http://schemas.openxmlformats.org/drawingml/2006/main" xmlns:r="http://schemas.openxmlformats.org/officeDocument/2006/relationships" xmlns:p="http://schemas.openxmlformats.org/presentationml/2006/main">
   <p:cSld>
     <p:spTree>
@@ -16287,25 +17169,25 @@
           <a:p>
             <a:r>
               <a:rPr lang="en-US" dirty="0"/>
-              <a:t>A forest right outside a fenced in park –(needs a description)</a:t>
+              <a:t>A forest right outside a fenced in park </a:t>
             </a:r>
           </a:p>
           <a:p>
             <a:r>
               <a:rPr lang="en-US" dirty="0"/>
-              <a:t>The park which is vast and includes hills, trees, boulders, playground equipment, water fountains, winding sidewalks, and a few park benches which the homeless man likes to populates</a:t>
+              <a:t>The local park itself, which is quite vast, and includes hills, trees, boulders, playground equipment, water fountains, winding sidewalks, and a few park benches which the homeless man likes to populate.</a:t>
             </a:r>
           </a:p>
           <a:p>
             <a:r>
               <a:rPr lang="en-US" dirty="0"/>
-              <a:t>Pablo’s home neighborhood – (add some stuff here)</a:t>
+              <a:t>Pablo’s home neighborhood , where he must return to complete his given quest.</a:t>
             </a:r>
           </a:p>
           <a:p>
             <a:r>
               <a:rPr lang="en-US" dirty="0"/>
-              <a:t>As Pablo traverses through the levels, he will come closer and closer to the main road which leads him back home. Meanwhile, time will pass, and light will dim, turning the pleasant afternoon shadows into something almost sinister</a:t>
+              <a:t>As Pablo traverses through the levels, he will come closer and closer to the main road which leads him back home. Meanwhile, time will pass, and light will dim, turning the pleasant afternoon shadows into something almost sinister.</a:t>
             </a:r>
           </a:p>
         </p:txBody>
@@ -16729,7 +17611,7 @@
           <a:p>
             <a:r>
               <a:rPr lang="en-US" dirty="0"/>
-              <a:t> Pablo turns this message into his own heroic quest. He grabs a stick and ventures forth through the park to find the groceries he had lost so that they may return home before the sun goes down and the streetlights turn on.</a:t>
+              <a:t> Pablo turns this message into his own heroic quest. He grabs a stick and ventures forth through the forest, into the park, and back to his neighborhood suburb where he has to find the groceries he lost, and return home before the sun goes down and the streetlights turn on.</a:t>
             </a:r>
           </a:p>
         </p:txBody>
@@ -18061,7 +18943,13 @@
           <a:p>
             <a:r>
               <a:rPr lang="en-US" dirty="0"/>
-              <a:t>At the beginning, enemies will be weak and sporadic. There will be a sense of calm as you explore the forest area. The sounds of birds chirping, and other soothing ambient sounds will play periodically. The player will find items throughout the level which will buff him permanently and give him access to new areas previously impossible to reach. However, as time passes, the sun will sink lower and lower. The light color and amount will change accordingly. </a:t>
+              <a:t>At the beginning, enemies will be weak and sporadic. There will be a sense of calm as you explore the forest area. The sounds of birds chirping, and other soothing ambient sounds will play periodically. </a:t>
+            </a:r>
+          </a:p>
+          <a:p>
+            <a:r>
+              <a:rPr lang="en-US" dirty="0"/>
+              <a:t>The player will find items throughout the level which will buff him permanently and give him access to new areas previously impossible to reach. However, as time passes, the sun will sink lower and lower. The light color and amount will change accordingly. </a:t>
             </a:r>
           </a:p>
           <a:p>
@@ -18221,6 +19109,55 @@
                                           <p:spTgt spid="3">
                                             <p:txEl>
                                               <p:pRg st="1" end="1"/>
+                                            </p:txEl>
+                                          </p:spTgt>
+                                        </p:tgtEl>
+                                        <p:attrNameLst>
+                                          <p:attrName>style.visibility</p:attrName>
+                                        </p:attrNameLst>
+                                      </p:cBhvr>
+                                      <p:to>
+                                        <p:strVal val="visible"/>
+                                      </p:to>
+                                    </p:set>
+                                  </p:childTnLst>
+                                </p:cTn>
+                              </p:par>
+                            </p:childTnLst>
+                          </p:cTn>
+                        </p:par>
+                      </p:childTnLst>
+                    </p:cTn>
+                  </p:par>
+                  <p:par>
+                    <p:cTn id="16" fill="hold">
+                      <p:stCondLst>
+                        <p:cond delay="indefinite"/>
+                      </p:stCondLst>
+                      <p:childTnLst>
+                        <p:par>
+                          <p:cTn id="17" fill="hold">
+                            <p:stCondLst>
+                              <p:cond delay="0"/>
+                            </p:stCondLst>
+                            <p:childTnLst>
+                              <p:par>
+                                <p:cTn id="18" presetID="1" presetClass="entr" presetSubtype="0" fill="hold" grpId="0" nodeType="clickEffect">
+                                  <p:stCondLst>
+                                    <p:cond delay="0"/>
+                                  </p:stCondLst>
+                                  <p:childTnLst>
+                                    <p:set>
+                                      <p:cBhvr>
+                                        <p:cTn id="19" dur="1" fill="hold">
+                                          <p:stCondLst>
+                                            <p:cond delay="0"/>
+                                          </p:stCondLst>
+                                        </p:cTn>
+                                        <p:tgtEl>
+                                          <p:spTgt spid="3">
+                                            <p:txEl>
+                                              <p:pRg st="2" end="2"/>
                                             </p:txEl>
                                           </p:spTgt>
                                         </p:tgtEl>

</xml_diff>

<commit_message>
phase 1 project submission, finalized
</commit_message>
<xml_diff>
--- a/VGD_Presentation.pptx
+++ b/VGD_Presentation.pptx
@@ -15772,34 +15772,36 @@
           </a:p>
         </p:txBody>
       </p:sp>
-      <p:sp>
-        <p:nvSpPr>
-          <p:cNvPr id="3" name="Content Placeholder 2">
+      <p:pic>
+        <p:nvPicPr>
+          <p:cNvPr id="4" name="Picture 3">
             <a:extLst>
               <a:ext uri="{FF2B5EF4-FFF2-40B4-BE49-F238E27FC236}">
-                <a16:creationId xmlns:a16="http://schemas.microsoft.com/office/drawing/2014/main" id="{6C1E84BE-FBE8-4C39-B7CF-E86733E11277}"/>
+                <a16:creationId xmlns:a16="http://schemas.microsoft.com/office/drawing/2014/main" id="{E5F587A5-F404-43B8-9E7A-10B69BF9D778}"/>
               </a:ext>
             </a:extLst>
           </p:cNvPr>
-          <p:cNvSpPr>
-            <a:spLocks noGrp="1"/>
-          </p:cNvSpPr>
-          <p:nvPr>
-            <p:ph idx="1"/>
-          </p:nvPr>
-        </p:nvSpPr>
-        <p:spPr/>
-        <p:txBody>
-          <a:bodyPr/>
-          <a:lstStyle/>
-          <a:p>
-            <a:r>
-              <a:rPr lang="en-US" dirty="0"/>
-              <a:t>(add screen shot of website here)</a:t>
-            </a:r>
-          </a:p>
-        </p:txBody>
-      </p:sp>
+          <p:cNvPicPr>
+            <a:picLocks noChangeAspect="1"/>
+          </p:cNvPicPr>
+          <p:nvPr/>
+        </p:nvPicPr>
+        <p:blipFill>
+          <a:blip r:embed="rId2"/>
+          <a:stretch>
+            <a:fillRect/>
+          </a:stretch>
+        </p:blipFill>
+        <p:spPr>
+          <a:xfrm>
+            <a:off x="1162026" y="1520337"/>
+            <a:ext cx="10514535" cy="4376609"/>
+          </a:xfrm>
+          <a:prstGeom prst="rect">
+            <a:avLst/>
+          </a:prstGeom>
+        </p:spPr>
+      </p:pic>
     </p:spTree>
     <p:extLst>
       <p:ext uri="{BB962C8B-B14F-4D97-AF65-F5344CB8AC3E}">
@@ -15871,55 +15873,6 @@
                       </p:childTnLst>
                     </p:cTn>
                   </p:par>
-                  <p:par>
-                    <p:cTn id="8" fill="hold">
-                      <p:stCondLst>
-                        <p:cond delay="indefinite"/>
-                      </p:stCondLst>
-                      <p:childTnLst>
-                        <p:par>
-                          <p:cTn id="9" fill="hold">
-                            <p:stCondLst>
-                              <p:cond delay="0"/>
-                            </p:stCondLst>
-                            <p:childTnLst>
-                              <p:par>
-                                <p:cTn id="10" presetID="1" presetClass="entr" presetSubtype="0" fill="hold" grpId="0" nodeType="clickEffect">
-                                  <p:stCondLst>
-                                    <p:cond delay="0"/>
-                                  </p:stCondLst>
-                                  <p:childTnLst>
-                                    <p:set>
-                                      <p:cBhvr>
-                                        <p:cTn id="11" dur="1" fill="hold">
-                                          <p:stCondLst>
-                                            <p:cond delay="0"/>
-                                          </p:stCondLst>
-                                        </p:cTn>
-                                        <p:tgtEl>
-                                          <p:spTgt spid="3">
-                                            <p:txEl>
-                                              <p:pRg st="0" end="0"/>
-                                            </p:txEl>
-                                          </p:spTgt>
-                                        </p:tgtEl>
-                                        <p:attrNameLst>
-                                          <p:attrName>style.visibility</p:attrName>
-                                        </p:attrNameLst>
-                                      </p:cBhvr>
-                                      <p:to>
-                                        <p:strVal val="visible"/>
-                                      </p:to>
-                                    </p:set>
-                                  </p:childTnLst>
-                                </p:cTn>
-                              </p:par>
-                            </p:childTnLst>
-                          </p:cTn>
-                        </p:par>
-                      </p:childTnLst>
-                    </p:cTn>
-                  </p:par>
                 </p:childTnLst>
               </p:cTn>
               <p:prevCondLst>
@@ -15943,7 +15896,6 @@
     </p:tnLst>
     <p:bldLst>
       <p:bldP spid="2" grpId="0"/>
-      <p:bldP spid="3" grpId="0" build="p"/>
     </p:bldLst>
   </p:timing>
 </p:sld>

</xml_diff>